<commit_message>
feat: Add Python script for programmatic PowerPoint presentation generation, including custom slides, tables, and charts.
</commit_message>
<xml_diff>
--- a/test_output_charts.pptx
+++ b/test_output_charts.pptx
@@ -394,7 +394,7 @@
         </c:ser>
         <c:dLbls>
           <c:txPr>
-            <a:bodyPr/>
+            <a:bodyPr rot="-5400000" vert="horz"/>
             <a:lstStyle/>
             <a:p>
               <a:pPr>
@@ -538,7 +538,7 @@
         </c:ser>
         <c:dLbls>
           <c:txPr>
-            <a:bodyPr/>
+            <a:bodyPr rot="-5400000" vert="horz"/>
             <a:lstStyle/>
             <a:p>
               <a:pPr>

</xml_diff>

<commit_message>
feat: Add Python script to generate PowerPoint presentations with dynamic content including summaries, tables, and charts.
</commit_message>
<xml_diff>
--- a/test_output_charts.pptx
+++ b/test_output_charts.pptx
@@ -274,6 +274,78 @@
               </c:strCache>
             </c:strRef>
           </c:tx>
+          <c:dLbls>
+            <c:dLbl>
+              <c:idx val="0"/>
+              <c:spPr/>
+              <c:txPr>
+                <a:bodyPr/>
+                <a:lstStyle/>
+                <a:p>
+                  <a:pPr>
+                    <a:defRPr>
+                      <a:solidFill>
+                        <a:srgbClr val="FFFFFF"/>
+                      </a:solidFill>
+                    </a:defRPr>
+                  </a:pPr>
+                </a:p>
+              </c:txPr>
+              <c:dLblPos val="inEnd"/>
+              <c:showLegendKey val="0"/>
+              <c:showVal val="1"/>
+              <c:showCatName val="0"/>
+              <c:showSerName val="0"/>
+              <c:showPercent val="0"/>
+              <c:showBubbleSize val="0"/>
+            </c:dLbl>
+            <c:dLbl>
+              <c:idx val="1"/>
+              <c:spPr/>
+              <c:txPr>
+                <a:bodyPr/>
+                <a:lstStyle/>
+                <a:p>
+                  <a:pPr>
+                    <a:defRPr>
+                      <a:solidFill>
+                        <a:srgbClr val="FFFFFF"/>
+                      </a:solidFill>
+                    </a:defRPr>
+                  </a:pPr>
+                </a:p>
+              </c:txPr>
+              <c:dLblPos val="inEnd"/>
+              <c:showLegendKey val="0"/>
+              <c:showVal val="1"/>
+              <c:showCatName val="0"/>
+              <c:showSerName val="0"/>
+              <c:showPercent val="0"/>
+              <c:showBubbleSize val="0"/>
+            </c:dLbl>
+            <c:txPr>
+              <a:bodyPr/>
+              <a:lstStyle/>
+              <a:p>
+                <a:pPr>
+                  <a:defRPr sz="800">
+                    <a:solidFill>
+                      <a:srgbClr val="FFFFFF"/>
+                    </a:solidFill>
+                    <a:latin typeface="Avenir Medium"/>
+                  </a:defRPr>
+                </a:pPr>
+              </a:p>
+            </c:txPr>
+            <c:dLblPos val="inEnd"/>
+            <c:showLegendKey val="0"/>
+            <c:showVal val="0"/>
+            <c:showCatName val="0"/>
+            <c:showSerName val="0"/>
+            <c:showPercent val="0"/>
+            <c:showBubbleSize val="0"/>
+            <c:showLeaderLines val="1"/>
+          </c:dLbls>
           <c:cat>
             <c:strRef>
               <c:f>Sheet1!$A$2:$A$3</c:f>
@@ -318,6 +390,78 @@
               </c:strCache>
             </c:strRef>
           </c:tx>
+          <c:dLbls>
+            <c:dLbl>
+              <c:idx val="0"/>
+              <c:spPr/>
+              <c:txPr>
+                <a:bodyPr/>
+                <a:lstStyle/>
+                <a:p>
+                  <a:pPr>
+                    <a:defRPr>
+                      <a:solidFill>
+                        <a:srgbClr val="FFFFFF"/>
+                      </a:solidFill>
+                    </a:defRPr>
+                  </a:pPr>
+                </a:p>
+              </c:txPr>
+              <c:dLblPos val="inEnd"/>
+              <c:showLegendKey val="0"/>
+              <c:showVal val="1"/>
+              <c:showCatName val="0"/>
+              <c:showSerName val="0"/>
+              <c:showPercent val="0"/>
+              <c:showBubbleSize val="0"/>
+            </c:dLbl>
+            <c:dLbl>
+              <c:idx val="1"/>
+              <c:spPr/>
+              <c:txPr>
+                <a:bodyPr/>
+                <a:lstStyle/>
+                <a:p>
+                  <a:pPr>
+                    <a:defRPr>
+                      <a:solidFill>
+                        <a:srgbClr val="FFFFFF"/>
+                      </a:solidFill>
+                    </a:defRPr>
+                  </a:pPr>
+                </a:p>
+              </c:txPr>
+              <c:dLblPos val="inEnd"/>
+              <c:showLegendKey val="0"/>
+              <c:showVal val="1"/>
+              <c:showCatName val="0"/>
+              <c:showSerName val="0"/>
+              <c:showPercent val="0"/>
+              <c:showBubbleSize val="0"/>
+            </c:dLbl>
+            <c:txPr>
+              <a:bodyPr/>
+              <a:lstStyle/>
+              <a:p>
+                <a:pPr>
+                  <a:defRPr sz="800">
+                    <a:solidFill>
+                      <a:srgbClr val="FFFFFF"/>
+                    </a:solidFill>
+                    <a:latin typeface="Avenir Medium"/>
+                  </a:defRPr>
+                </a:pPr>
+              </a:p>
+            </c:txPr>
+            <c:dLblPos val="inEnd"/>
+            <c:showLegendKey val="0"/>
+            <c:showVal val="0"/>
+            <c:showCatName val="0"/>
+            <c:showSerName val="0"/>
+            <c:showPercent val="0"/>
+            <c:showBubbleSize val="0"/>
+            <c:showLeaderLines val="1"/>
+          </c:dLbls>
           <c:cat>
             <c:strRef>
               <c:f>Sheet1!$A$2:$A$3</c:f>
@@ -362,6 +506,78 @@
               </c:strCache>
             </c:strRef>
           </c:tx>
+          <c:dLbls>
+            <c:dLbl>
+              <c:idx val="0"/>
+              <c:spPr/>
+              <c:txPr>
+                <a:bodyPr/>
+                <a:lstStyle/>
+                <a:p>
+                  <a:pPr>
+                    <a:defRPr>
+                      <a:solidFill>
+                        <a:srgbClr val="FFFFFF"/>
+                      </a:solidFill>
+                    </a:defRPr>
+                  </a:pPr>
+                </a:p>
+              </c:txPr>
+              <c:dLblPos val="inEnd"/>
+              <c:showLegendKey val="0"/>
+              <c:showVal val="1"/>
+              <c:showCatName val="0"/>
+              <c:showSerName val="0"/>
+              <c:showPercent val="0"/>
+              <c:showBubbleSize val="0"/>
+            </c:dLbl>
+            <c:dLbl>
+              <c:idx val="1"/>
+              <c:spPr/>
+              <c:txPr>
+                <a:bodyPr/>
+                <a:lstStyle/>
+                <a:p>
+                  <a:pPr>
+                    <a:defRPr>
+                      <a:solidFill>
+                        <a:srgbClr val="FFFFFF"/>
+                      </a:solidFill>
+                    </a:defRPr>
+                  </a:pPr>
+                </a:p>
+              </c:txPr>
+              <c:dLblPos val="inEnd"/>
+              <c:showLegendKey val="0"/>
+              <c:showVal val="1"/>
+              <c:showCatName val="0"/>
+              <c:showSerName val="0"/>
+              <c:showPercent val="0"/>
+              <c:showBubbleSize val="0"/>
+            </c:dLbl>
+            <c:txPr>
+              <a:bodyPr/>
+              <a:lstStyle/>
+              <a:p>
+                <a:pPr>
+                  <a:defRPr sz="800">
+                    <a:solidFill>
+                      <a:srgbClr val="FFFFFF"/>
+                    </a:solidFill>
+                    <a:latin typeface="Avenir Medium"/>
+                  </a:defRPr>
+                </a:pPr>
+              </a:p>
+            </c:txPr>
+            <c:dLblPos val="inEnd"/>
+            <c:showLegendKey val="0"/>
+            <c:showVal val="0"/>
+            <c:showCatName val="0"/>
+            <c:showSerName val="0"/>
+            <c:showPercent val="0"/>
+            <c:showBubbleSize val="0"/>
+            <c:showLeaderLines val="1"/>
+          </c:dLbls>
           <c:cat>
             <c:strRef>
               <c:f>Sheet1!$A$2:$A$3</c:f>
@@ -393,21 +609,6 @@
           </c:val>
         </c:ser>
         <c:dLbls>
-          <c:txPr>
-            <a:bodyPr rot="-5400000" vert="horz"/>
-            <a:lstStyle/>
-            <a:p>
-              <a:pPr>
-                <a:defRPr sz="800">
-                  <a:solidFill>
-                    <a:srgbClr val="FFFFFF"/>
-                  </a:solidFill>
-                  <a:latin typeface="Avenir Medium"/>
-                </a:defRPr>
-              </a:pPr>
-            </a:p>
-          </c:txPr>
-          <c:dLblPos val="inEnd"/>
           <c:showLegendKey val="0"/>
           <c:showVal val="1"/>
           <c:showCatName val="0"/>
@@ -512,6 +713,54 @@
               </c:strCache>
             </c:strRef>
           </c:tx>
+          <c:dLbls>
+            <c:dLbl>
+              <c:idx val="0"/>
+              <c:spPr/>
+              <c:txPr>
+                <a:bodyPr/>
+                <a:lstStyle/>
+                <a:p>
+                  <a:pPr>
+                    <a:defRPr>
+                      <a:solidFill>
+                        <a:srgbClr val="FFFFFF"/>
+                      </a:solidFill>
+                    </a:defRPr>
+                  </a:pPr>
+                </a:p>
+              </c:txPr>
+              <c:dLblPos val="inEnd"/>
+              <c:showLegendKey val="0"/>
+              <c:showVal val="1"/>
+              <c:showCatName val="0"/>
+              <c:showSerName val="0"/>
+              <c:showPercent val="0"/>
+              <c:showBubbleSize val="0"/>
+            </c:dLbl>
+            <c:txPr>
+              <a:bodyPr/>
+              <a:lstStyle/>
+              <a:p>
+                <a:pPr>
+                  <a:defRPr sz="800">
+                    <a:solidFill>
+                      <a:srgbClr val="FFFFFF"/>
+                    </a:solidFill>
+                    <a:latin typeface="Avenir Medium"/>
+                  </a:defRPr>
+                </a:pPr>
+              </a:p>
+            </c:txPr>
+            <c:dLblPos val="inEnd"/>
+            <c:showLegendKey val="0"/>
+            <c:showVal val="0"/>
+            <c:showCatName val="0"/>
+            <c:showSerName val="0"/>
+            <c:showPercent val="0"/>
+            <c:showBubbleSize val="0"/>
+            <c:showLeaderLines val="1"/>
+          </c:dLbls>
           <c:cat>
             <c:strRef>
               <c:f>Sheet1!$A$2:$A$2</c:f>
@@ -537,21 +786,6 @@
           </c:val>
         </c:ser>
         <c:dLbls>
-          <c:txPr>
-            <a:bodyPr rot="-5400000" vert="horz"/>
-            <a:lstStyle/>
-            <a:p>
-              <a:pPr>
-                <a:defRPr sz="800">
-                  <a:solidFill>
-                    <a:srgbClr val="FFFFFF"/>
-                  </a:solidFill>
-                  <a:latin typeface="Avenir Medium"/>
-                </a:defRPr>
-              </a:pPr>
-            </a:p>
-          </c:txPr>
-          <c:dLblPos val="inEnd"/>
           <c:showLegendKey val="0"/>
           <c:showVal val="1"/>
           <c:showCatName val="0"/>

</xml_diff>

<commit_message>
feat: add Python script for generating PowerPoint presentations with various slide types including logo, intro, summary, tables, and charts.
</commit_message>
<xml_diff>
--- a/test_output_charts.pptx
+++ b/test_output_charts.pptx
@@ -274,78 +274,6 @@
               </c:strCache>
             </c:strRef>
           </c:tx>
-          <c:dLbls>
-            <c:dLbl>
-              <c:idx val="0"/>
-              <c:spPr/>
-              <c:txPr>
-                <a:bodyPr/>
-                <a:lstStyle/>
-                <a:p>
-                  <a:pPr>
-                    <a:defRPr>
-                      <a:solidFill>
-                        <a:srgbClr val="FFFFFF"/>
-                      </a:solidFill>
-                    </a:defRPr>
-                  </a:pPr>
-                </a:p>
-              </c:txPr>
-              <c:dLblPos val="inEnd"/>
-              <c:showLegendKey val="0"/>
-              <c:showVal val="1"/>
-              <c:showCatName val="0"/>
-              <c:showSerName val="0"/>
-              <c:showPercent val="0"/>
-              <c:showBubbleSize val="0"/>
-            </c:dLbl>
-            <c:dLbl>
-              <c:idx val="1"/>
-              <c:spPr/>
-              <c:txPr>
-                <a:bodyPr/>
-                <a:lstStyle/>
-                <a:p>
-                  <a:pPr>
-                    <a:defRPr>
-                      <a:solidFill>
-                        <a:srgbClr val="FFFFFF"/>
-                      </a:solidFill>
-                    </a:defRPr>
-                  </a:pPr>
-                </a:p>
-              </c:txPr>
-              <c:dLblPos val="inEnd"/>
-              <c:showLegendKey val="0"/>
-              <c:showVal val="1"/>
-              <c:showCatName val="0"/>
-              <c:showSerName val="0"/>
-              <c:showPercent val="0"/>
-              <c:showBubbleSize val="0"/>
-            </c:dLbl>
-            <c:txPr>
-              <a:bodyPr/>
-              <a:lstStyle/>
-              <a:p>
-                <a:pPr>
-                  <a:defRPr sz="800">
-                    <a:solidFill>
-                      <a:srgbClr val="FFFFFF"/>
-                    </a:solidFill>
-                    <a:latin typeface="Avenir Medium"/>
-                  </a:defRPr>
-                </a:pPr>
-              </a:p>
-            </c:txPr>
-            <c:dLblPos val="inEnd"/>
-            <c:showLegendKey val="0"/>
-            <c:showVal val="0"/>
-            <c:showCatName val="0"/>
-            <c:showSerName val="0"/>
-            <c:showPercent val="0"/>
-            <c:showBubbleSize val="0"/>
-            <c:showLeaderLines val="1"/>
-          </c:dLbls>
           <c:cat>
             <c:strRef>
               <c:f>Sheet1!$A$2:$A$3</c:f>
@@ -390,78 +318,6 @@
               </c:strCache>
             </c:strRef>
           </c:tx>
-          <c:dLbls>
-            <c:dLbl>
-              <c:idx val="0"/>
-              <c:spPr/>
-              <c:txPr>
-                <a:bodyPr/>
-                <a:lstStyle/>
-                <a:p>
-                  <a:pPr>
-                    <a:defRPr>
-                      <a:solidFill>
-                        <a:srgbClr val="FFFFFF"/>
-                      </a:solidFill>
-                    </a:defRPr>
-                  </a:pPr>
-                </a:p>
-              </c:txPr>
-              <c:dLblPos val="inEnd"/>
-              <c:showLegendKey val="0"/>
-              <c:showVal val="1"/>
-              <c:showCatName val="0"/>
-              <c:showSerName val="0"/>
-              <c:showPercent val="0"/>
-              <c:showBubbleSize val="0"/>
-            </c:dLbl>
-            <c:dLbl>
-              <c:idx val="1"/>
-              <c:spPr/>
-              <c:txPr>
-                <a:bodyPr/>
-                <a:lstStyle/>
-                <a:p>
-                  <a:pPr>
-                    <a:defRPr>
-                      <a:solidFill>
-                        <a:srgbClr val="FFFFFF"/>
-                      </a:solidFill>
-                    </a:defRPr>
-                  </a:pPr>
-                </a:p>
-              </c:txPr>
-              <c:dLblPos val="inEnd"/>
-              <c:showLegendKey val="0"/>
-              <c:showVal val="1"/>
-              <c:showCatName val="0"/>
-              <c:showSerName val="0"/>
-              <c:showPercent val="0"/>
-              <c:showBubbleSize val="0"/>
-            </c:dLbl>
-            <c:txPr>
-              <a:bodyPr/>
-              <a:lstStyle/>
-              <a:p>
-                <a:pPr>
-                  <a:defRPr sz="800">
-                    <a:solidFill>
-                      <a:srgbClr val="FFFFFF"/>
-                    </a:solidFill>
-                    <a:latin typeface="Avenir Medium"/>
-                  </a:defRPr>
-                </a:pPr>
-              </a:p>
-            </c:txPr>
-            <c:dLblPos val="inEnd"/>
-            <c:showLegendKey val="0"/>
-            <c:showVal val="0"/>
-            <c:showCatName val="0"/>
-            <c:showSerName val="0"/>
-            <c:showPercent val="0"/>
-            <c:showBubbleSize val="0"/>
-            <c:showLeaderLines val="1"/>
-          </c:dLbls>
           <c:cat>
             <c:strRef>
               <c:f>Sheet1!$A$2:$A$3</c:f>
@@ -506,78 +362,6 @@
               </c:strCache>
             </c:strRef>
           </c:tx>
-          <c:dLbls>
-            <c:dLbl>
-              <c:idx val="0"/>
-              <c:spPr/>
-              <c:txPr>
-                <a:bodyPr/>
-                <a:lstStyle/>
-                <a:p>
-                  <a:pPr>
-                    <a:defRPr>
-                      <a:solidFill>
-                        <a:srgbClr val="FFFFFF"/>
-                      </a:solidFill>
-                    </a:defRPr>
-                  </a:pPr>
-                </a:p>
-              </c:txPr>
-              <c:dLblPos val="inEnd"/>
-              <c:showLegendKey val="0"/>
-              <c:showVal val="1"/>
-              <c:showCatName val="0"/>
-              <c:showSerName val="0"/>
-              <c:showPercent val="0"/>
-              <c:showBubbleSize val="0"/>
-            </c:dLbl>
-            <c:dLbl>
-              <c:idx val="1"/>
-              <c:spPr/>
-              <c:txPr>
-                <a:bodyPr/>
-                <a:lstStyle/>
-                <a:p>
-                  <a:pPr>
-                    <a:defRPr>
-                      <a:solidFill>
-                        <a:srgbClr val="FFFFFF"/>
-                      </a:solidFill>
-                    </a:defRPr>
-                  </a:pPr>
-                </a:p>
-              </c:txPr>
-              <c:dLblPos val="inEnd"/>
-              <c:showLegendKey val="0"/>
-              <c:showVal val="1"/>
-              <c:showCatName val="0"/>
-              <c:showSerName val="0"/>
-              <c:showPercent val="0"/>
-              <c:showBubbleSize val="0"/>
-            </c:dLbl>
-            <c:txPr>
-              <a:bodyPr/>
-              <a:lstStyle/>
-              <a:p>
-                <a:pPr>
-                  <a:defRPr sz="800">
-                    <a:solidFill>
-                      <a:srgbClr val="FFFFFF"/>
-                    </a:solidFill>
-                    <a:latin typeface="Avenir Medium"/>
-                  </a:defRPr>
-                </a:pPr>
-              </a:p>
-            </c:txPr>
-            <c:dLblPos val="inEnd"/>
-            <c:showLegendKey val="0"/>
-            <c:showVal val="0"/>
-            <c:showCatName val="0"/>
-            <c:showSerName val="0"/>
-            <c:showPercent val="0"/>
-            <c:showBubbleSize val="0"/>
-            <c:showLeaderLines val="1"/>
-          </c:dLbls>
           <c:cat>
             <c:strRef>
               <c:f>Sheet1!$A$2:$A$3</c:f>
@@ -609,6 +393,21 @@
           </c:val>
         </c:ser>
         <c:dLbls>
+          <c:txPr>
+            <a:bodyPr rot="-5400000" vert="horz"/>
+            <a:lstStyle/>
+            <a:p>
+              <a:pPr>
+                <a:defRPr sz="800">
+                  <a:solidFill>
+                    <a:srgbClr val="FFFFFF"/>
+                  </a:solidFill>
+                  <a:latin typeface="Avenir Medium"/>
+                </a:defRPr>
+              </a:pPr>
+            </a:p>
+          </c:txPr>
+          <c:dLblPos val="inEnd"/>
           <c:showLegendKey val="0"/>
           <c:showVal val="1"/>
           <c:showCatName val="0"/>
@@ -655,6 +454,7 @@
         <c:tickLblPos val="nextTo"/>
         <c:crossAx val="-2068027336"/>
         <c:crosses val="autoZero"/>
+        <c:majorUnit val="5000000.0"/>
       </c:valAx>
     </c:plotArea>
     <c:legend>
@@ -713,54 +513,6 @@
               </c:strCache>
             </c:strRef>
           </c:tx>
-          <c:dLbls>
-            <c:dLbl>
-              <c:idx val="0"/>
-              <c:spPr/>
-              <c:txPr>
-                <a:bodyPr/>
-                <a:lstStyle/>
-                <a:p>
-                  <a:pPr>
-                    <a:defRPr>
-                      <a:solidFill>
-                        <a:srgbClr val="FFFFFF"/>
-                      </a:solidFill>
-                    </a:defRPr>
-                  </a:pPr>
-                </a:p>
-              </c:txPr>
-              <c:dLblPos val="inEnd"/>
-              <c:showLegendKey val="0"/>
-              <c:showVal val="1"/>
-              <c:showCatName val="0"/>
-              <c:showSerName val="0"/>
-              <c:showPercent val="0"/>
-              <c:showBubbleSize val="0"/>
-            </c:dLbl>
-            <c:txPr>
-              <a:bodyPr/>
-              <a:lstStyle/>
-              <a:p>
-                <a:pPr>
-                  <a:defRPr sz="800">
-                    <a:solidFill>
-                      <a:srgbClr val="FFFFFF"/>
-                    </a:solidFill>
-                    <a:latin typeface="Avenir Medium"/>
-                  </a:defRPr>
-                </a:pPr>
-              </a:p>
-            </c:txPr>
-            <c:dLblPos val="inEnd"/>
-            <c:showLegendKey val="0"/>
-            <c:showVal val="0"/>
-            <c:showCatName val="0"/>
-            <c:showSerName val="0"/>
-            <c:showPercent val="0"/>
-            <c:showBubbleSize val="0"/>
-            <c:showLeaderLines val="1"/>
-          </c:dLbls>
           <c:cat>
             <c:strRef>
               <c:f>Sheet1!$A$2:$A$2</c:f>
@@ -786,6 +538,21 @@
           </c:val>
         </c:ser>
         <c:dLbls>
+          <c:txPr>
+            <a:bodyPr rot="-5400000" vert="horz"/>
+            <a:lstStyle/>
+            <a:p>
+              <a:pPr>
+                <a:defRPr sz="800">
+                  <a:solidFill>
+                    <a:srgbClr val="FFFFFF"/>
+                  </a:solidFill>
+                  <a:latin typeface="Avenir Medium"/>
+                </a:defRPr>
+              </a:pPr>
+            </a:p>
+          </c:txPr>
+          <c:dLblPos val="inEnd"/>
           <c:showLegendKey val="0"/>
           <c:showVal val="1"/>
           <c:showCatName val="0"/>
@@ -832,6 +599,7 @@
         <c:tickLblPos val="nextTo"/>
         <c:crossAx val="-2068027336"/>
         <c:crosses val="autoZero"/>
+        <c:majorUnit val="5000000.0"/>
       </c:valAx>
     </c:plotArea>
     <c:legend>

</xml_diff>

<commit_message>
feat: Add `generate-ppt.py` script for programmatic PowerPoint presentation generation, including summary, table, and chart slides.
</commit_message>
<xml_diff>
--- a/test_output_charts.pptx
+++ b/test_output_charts.pptx
@@ -3900,7 +3900,7 @@
         </p:nvGraphicFramePr>
         <p:xfrm>
           <a:off x="457200" y="1371600"/>
-          <a:ext cx="8229600" cy="4572000"/>
+          <a:ext cx="8229600" cy="5303520"/>
         </p:xfrm>
         <a:graphic>
           <a:graphicData uri="http://schemas.openxmlformats.org/drawingml/2006/chart">
@@ -4855,7 +4855,7 @@
         </p:nvGraphicFramePr>
         <p:xfrm>
           <a:off x="457200" y="1371600"/>
-          <a:ext cx="8229600" cy="4572000"/>
+          <a:ext cx="8229600" cy="5303520"/>
         </p:xfrm>
         <a:graphic>
           <a:graphicData uri="http://schemas.openxmlformats.org/drawingml/2006/chart">
@@ -5147,7 +5147,7 @@
         </p:nvGraphicFramePr>
         <p:xfrm>
           <a:off x="457200" y="1371600"/>
-          <a:ext cx="8229600" cy="4572000"/>
+          <a:ext cx="8229600" cy="5303520"/>
         </p:xfrm>
         <a:graphic>
           <a:graphicData uri="http://schemas.openxmlformats.org/drawingml/2006/chart">
@@ -5521,7 +5521,7 @@
         </p:nvGraphicFramePr>
         <p:xfrm>
           <a:off x="457200" y="1371600"/>
-          <a:ext cx="8229600" cy="4572000"/>
+          <a:ext cx="8229600" cy="5303520"/>
         </p:xfrm>
         <a:graphic>
           <a:graphicData uri="http://schemas.openxmlformats.org/drawingml/2006/chart">

</xml_diff>

<commit_message>
feat: Add Python script for programmatic PowerPoint generation, including various slide layouts, tables, and charts.
</commit_message>
<xml_diff>
--- a/test_output_charts.pptx
+++ b/test_output_charts.pptx
@@ -3899,8 +3899,8 @@
           <p:nvPr/>
         </p:nvGraphicFramePr>
         <p:xfrm>
-          <a:off x="457200" y="1371600"/>
-          <a:ext cx="8229600" cy="5303520"/>
+          <a:off x="457200" y="1188720"/>
+          <a:ext cx="8229600" cy="5486400"/>
         </p:xfrm>
         <a:graphic>
           <a:graphicData uri="http://schemas.openxmlformats.org/drawingml/2006/chart">
@@ -4854,8 +4854,8 @@
           <p:nvPr/>
         </p:nvGraphicFramePr>
         <p:xfrm>
-          <a:off x="457200" y="1371600"/>
-          <a:ext cx="8229600" cy="5303520"/>
+          <a:off x="457200" y="1188720"/>
+          <a:ext cx="8229600" cy="5486400"/>
         </p:xfrm>
         <a:graphic>
           <a:graphicData uri="http://schemas.openxmlformats.org/drawingml/2006/chart">
@@ -5146,8 +5146,8 @@
           <p:nvPr/>
         </p:nvGraphicFramePr>
         <p:xfrm>
-          <a:off x="457200" y="1371600"/>
-          <a:ext cx="8229600" cy="5303520"/>
+          <a:off x="457200" y="1188720"/>
+          <a:ext cx="8229600" cy="5486400"/>
         </p:xfrm>
         <a:graphic>
           <a:graphicData uri="http://schemas.openxmlformats.org/drawingml/2006/chart">
@@ -5520,8 +5520,8 @@
           <p:nvPr/>
         </p:nvGraphicFramePr>
         <p:xfrm>
-          <a:off x="457200" y="1371600"/>
-          <a:ext cx="8229600" cy="5303520"/>
+          <a:off x="457200" y="1188720"/>
+          <a:ext cx="8229600" cy="5486400"/>
         </p:xfrm>
         <a:graphic>
           <a:graphicData uri="http://schemas.openxmlformats.org/drawingml/2006/chart">

</xml_diff>

<commit_message>
feat: Add script for dynamic PowerPoint presentation generation and update example output file.
</commit_message>
<xml_diff>
--- a/test_output_charts.pptx
+++ b/test_output_charts.pptx
@@ -203,13 +203,6 @@
         <c:scaling/>
         <c:delete val="0"/>
         <c:axPos val="l"/>
-        <c:majorGridlines>
-          <c:spPr>
-            <a:ln>
-              <a:prstDash val="dash"/>
-            </a:ln>
-          </c:spPr>
-        </c:majorGridlines>
         <c:numFmt formatCode="0" sourceLinked="0"/>
         <c:majorTickMark val="out"/>
         <c:minorTickMark val="none"/>
@@ -441,13 +434,6 @@
         <c:scaling/>
         <c:delete val="0"/>
         <c:axPos val="l"/>
-        <c:majorGridlines>
-          <c:spPr>
-            <a:ln>
-              <a:prstDash val="dash"/>
-            </a:ln>
-          </c:spPr>
-        </c:majorGridlines>
         <c:numFmt formatCode="$ #,##0" sourceLinked="0"/>
         <c:majorTickMark val="out"/>
         <c:minorTickMark val="none"/>
@@ -586,13 +572,6 @@
         <c:scaling/>
         <c:delete val="0"/>
         <c:axPos val="l"/>
-        <c:majorGridlines>
-          <c:spPr>
-            <a:ln>
-              <a:prstDash val="dash"/>
-            </a:ln>
-          </c:spPr>
-        </c:majorGridlines>
         <c:numFmt formatCode="$ #,##0" sourceLinked="0"/>
         <c:majorTickMark val="out"/>
         <c:minorTickMark val="none"/>
@@ -781,13 +760,6 @@
         <c:scaling/>
         <c:delete val="0"/>
         <c:axPos val="l"/>
-        <c:majorGridlines>
-          <c:spPr>
-            <a:ln>
-              <a:prstDash val="dash"/>
-            </a:ln>
-          </c:spPr>
-        </c:majorGridlines>
         <c:numFmt formatCode="0%" sourceLinked="0"/>
         <c:majorTickMark val="out"/>
         <c:minorTickMark val="none"/>

</xml_diff>

<commit_message>
feat: Add and update assets, including a new logo, for PowerPoint chart generation.
</commit_message>
<xml_diff>
--- a/test_output_charts.pptx
+++ b/test_output_charts.pptx
@@ -17,6 +17,8 @@
     <p:sldId id="265" r:id="rId16"/>
     <p:sldId id="266" r:id="rId17"/>
     <p:sldId id="267" r:id="rId18"/>
+    <p:sldId id="268" r:id="rId19"/>
+    <p:sldId id="269" r:id="rId20"/>
   </p:sldIdLst>
   <p:sldSz cx="9144000" cy="6858000" type="screen4x3"/>
   <p:notesSz cx="6858000" cy="9144000"/>
@@ -386,6 +388,7 @@
           </c:val>
         </c:ser>
         <c:dLbls>
+          <c:numFmt formatCode="&quot;$&quot; #,##0" sourceLinked="0"/>
           <c:txPr>
             <a:bodyPr rot="-5400000" vert="horz"/>
             <a:lstStyle/>
@@ -434,7 +437,7 @@
         <c:scaling/>
         <c:delete val="0"/>
         <c:axPos val="l"/>
-        <c:numFmt formatCode="$ #,##0" sourceLinked="0"/>
+        <c:numFmt formatCode="&quot;$&quot; #,##0" sourceLinked="0"/>
         <c:majorTickMark val="out"/>
         <c:minorTickMark val="none"/>
         <c:tickLblPos val="nextTo"/>
@@ -524,6 +527,7 @@
           </c:val>
         </c:ser>
         <c:dLbls>
+          <c:numFmt formatCode="&quot;$&quot; #,##0" sourceLinked="0"/>
           <c:txPr>
             <a:bodyPr rot="-5400000" vert="horz"/>
             <a:lstStyle/>
@@ -572,7 +576,7 @@
         <c:scaling/>
         <c:delete val="0"/>
         <c:axPos val="l"/>
-        <c:numFmt formatCode="$ #,##0" sourceLinked="0"/>
+        <c:numFmt formatCode="&quot;$&quot; #,##0" sourceLinked="0"/>
         <c:majorTickMark val="out"/>
         <c:minorTickMark val="none"/>
         <c:tickLblPos val="nextTo"/>
@@ -747,6 +751,193 @@
         <c:axPos val="b"/>
         <c:majorTickMark val="out"/>
         <c:minorTickMark val="none"/>
+        <c:tickLblPos val="low"/>
+        <c:txPr>
+          <a:bodyPr/>
+          <a:lstStyle/>
+          <a:p>
+            <a:pPr>
+              <a:defRPr sz="900"/>
+            </a:pPr>
+          </a:p>
+        </c:txPr>
+        <c:crossAx val="2140495176"/>
+        <c:crosses val="autoZero"/>
+        <c:auto val="1"/>
+        <c:lblAlgn val="ctr"/>
+        <c:lblOffset val="100"/>
+        <c:noMultiLvlLbl val="0"/>
+      </c:catAx>
+      <c:valAx>
+        <c:axId val="2140495176"/>
+        <c:scaling/>
+        <c:delete val="0"/>
+        <c:axPos val="l"/>
+        <c:numFmt formatCode="0.0%" sourceLinked="0"/>
+        <c:majorTickMark val="out"/>
+        <c:minorTickMark val="none"/>
+        <c:tickLblPos val="nextTo"/>
+        <c:crossAx val="2118791784"/>
+        <c:crosses val="autoZero"/>
+      </c:valAx>
+    </c:plotArea>
+    <c:legend>
+      <c:legendPos val="b"/>
+      <c:layout/>
+      <c:overlay val="0"/>
+      <c:txPr>
+        <a:bodyPr/>
+        <a:lstStyle/>
+        <a:p>
+          <a:pPr>
+            <a:defRPr sz="900">
+              <a:latin typeface="Avenir Medium"/>
+            </a:defRPr>
+          </a:pPr>
+        </a:p>
+      </c:txPr>
+    </c:legend>
+    <c:plotVisOnly val="1"/>
+    <c:dispBlanksAs val="gap"/>
+    <c:showDLblsOverMax val="0"/>
+  </c:chart>
+  <c:txPr>
+    <a:bodyPr/>
+    <a:lstStyle/>
+    <a:p>
+      <a:pPr>
+        <a:defRPr sz="1800"/>
+      </a:pPr>
+      <a:endParaRPr lang="en-US"/>
+    </a:p>
+  </c:txPr>
+  <c:externalData r:id="rId1">
+    <c:autoUpdate val="0"/>
+  </c:externalData>
+</c:chartSpace>
+</file>
+
+<file path=ppt/charts/chart5.xml><?xml version="1.0" encoding="utf-8"?>
+<c:chartSpace xmlns:c="http://schemas.openxmlformats.org/drawingml/2006/chart" xmlns:a="http://schemas.openxmlformats.org/drawingml/2006/main" xmlns:r="http://schemas.openxmlformats.org/officeDocument/2006/relationships">
+  <c:date1904 val="0"/>
+  <c:chart>
+    <c:autoTitleDeleted val="0"/>
+    <c:plotArea>
+      <c:lineChart>
+        <c:grouping val="standard"/>
+        <c:varyColors val="0"/>
+        <c:ser>
+          <c:idx val="0"/>
+          <c:order val="0"/>
+          <c:tx>
+            <c:strRef>
+              <c:f>Sheet1!$B$1</c:f>
+              <c:strCache>
+                <c:ptCount val="1"/>
+                <c:pt idx="0">
+                  <c:v>Min</c:v>
+                </c:pt>
+              </c:strCache>
+            </c:strRef>
+          </c:tx>
+          <c:spPr/>
+          <c:marker>
+            <c:symbol val="none"/>
+          </c:marker>
+          <c:cat>
+            <c:strRef>
+              <c:f>Sheet1!$A$2:$A$3</c:f>
+              <c:strCache>
+                <c:ptCount val="2"/>
+                <c:pt idx="0">
+                  <c:v>Toyota</c:v>
+                </c:pt>
+                <c:pt idx="1">
+                  <c:v>Kia</c:v>
+                </c:pt>
+              </c:strCache>
+            </c:strRef>
+          </c:cat>
+          <c:val>
+            <c:numRef>
+              <c:f>Sheet1!$B$2:$B$3</c:f>
+              <c:numCache>
+                <c:formatCode>General</c:formatCode>
+                <c:ptCount val="2"/>
+                <c:pt idx="0">
+                  <c:v>10000000.0</c:v>
+                </c:pt>
+                <c:pt idx="1">
+                  <c:v>9000000.0</c:v>
+                </c:pt>
+              </c:numCache>
+            </c:numRef>
+          </c:val>
+          <c:smooth val="0"/>
+        </c:ser>
+        <c:ser>
+          <c:idx val="1"/>
+          <c:order val="1"/>
+          <c:tx>
+            <c:strRef>
+              <c:f>Sheet1!$C$1</c:f>
+              <c:strCache>
+                <c:ptCount val="1"/>
+                <c:pt idx="0">
+                  <c:v>Max</c:v>
+                </c:pt>
+              </c:strCache>
+            </c:strRef>
+          </c:tx>
+          <c:spPr/>
+          <c:marker>
+            <c:symbol val="none"/>
+          </c:marker>
+          <c:cat>
+            <c:strRef>
+              <c:f>Sheet1!$A$2:$A$3</c:f>
+              <c:strCache>
+                <c:ptCount val="2"/>
+                <c:pt idx="0">
+                  <c:v>Toyota</c:v>
+                </c:pt>
+                <c:pt idx="1">
+                  <c:v>Kia</c:v>
+                </c:pt>
+              </c:strCache>
+            </c:strRef>
+          </c:cat>
+          <c:val>
+            <c:numRef>
+              <c:f>Sheet1!$C$2:$C$3</c:f>
+              <c:numCache>
+                <c:formatCode>General</c:formatCode>
+                <c:ptCount val="2"/>
+                <c:pt idx="0">
+                  <c:v>20000000.0</c:v>
+                </c:pt>
+                <c:pt idx="1">
+                  <c:v>18000000.0</c:v>
+                </c:pt>
+              </c:numCache>
+            </c:numRef>
+          </c:val>
+          <c:smooth val="0"/>
+        </c:ser>
+        <c:marker val="1"/>
+        <c:smooth val="0"/>
+        <c:axId val="2118791784"/>
+        <c:axId val="2140495176"/>
+      </c:lineChart>
+      <c:catAx>
+        <c:axId val="2118791784"/>
+        <c:scaling>
+          <c:orientation val="minMax"/>
+        </c:scaling>
+        <c:delete val="0"/>
+        <c:axPos val="b"/>
+        <c:majorTickMark val="out"/>
+        <c:minorTickMark val="none"/>
         <c:tickLblPos val="nextTo"/>
         <c:crossAx val="2140495176"/>
         <c:crosses val="autoZero"/>
@@ -760,7 +951,6 @@
         <c:scaling/>
         <c:delete val="0"/>
         <c:axPos val="l"/>
-        <c:numFmt formatCode="0%" sourceLinked="0"/>
         <c:majorTickMark val="out"/>
         <c:minorTickMark val="none"/>
         <c:tickLblPos val="nextTo"/>
@@ -3793,30 +3983,6 @@
         <p:nvPr/>
       </p:nvGrpSpPr>
       <p:grpSpPr/>
-      <p:pic>
-        <p:nvPicPr>
-          <p:cNvPr id="2" name="Picture 1" descr="image.png"/>
-          <p:cNvPicPr>
-            <a:picLocks noChangeAspect="1"/>
-          </p:cNvPicPr>
-          <p:nvPr/>
-        </p:nvPicPr>
-        <p:blipFill>
-          <a:blip r:embed="rId2"/>
-          <a:stretch>
-            <a:fillRect/>
-          </a:stretch>
-        </p:blipFill>
-        <p:spPr>
-          <a:xfrm>
-            <a:off x="2057400" y="914400"/>
-            <a:ext cx="5029200" cy="5029200"/>
-          </a:xfrm>
-          <a:prstGeom prst="rect">
-            <a:avLst/>
-          </a:prstGeom>
-        </p:spPr>
-      </p:pic>
     </p:spTree>
   </p:cSld>
   <p:clrMapOvr>
@@ -4196,6 +4362,321 @@
 <file path=ppt/slides/slide12.xml><?xml version="1.0" encoding="utf-8"?>
 <p:sld xmlns:a="http://schemas.openxmlformats.org/drawingml/2006/main" xmlns:p="http://schemas.openxmlformats.org/presentationml/2006/main" xmlns:r="http://schemas.openxmlformats.org/officeDocument/2006/relationships">
   <p:cSld>
+    <p:spTree>
+      <p:nvGrpSpPr>
+        <p:cNvPr id="1" name=""/>
+        <p:cNvGrpSpPr/>
+        <p:nvPr/>
+      </p:nvGrpSpPr>
+      <p:grpSpPr/>
+      <p:sp>
+        <p:nvSpPr>
+          <p:cNvPr id="2" name="Title 1"/>
+          <p:cNvSpPr>
+            <a:spLocks noGrp="1"/>
+          </p:cNvSpPr>
+          <p:nvPr>
+            <p:ph type="title"/>
+          </p:nvPr>
+        </p:nvSpPr>
+        <p:spPr/>
+        <p:txBody>
+          <a:bodyPr/>
+          <a:lstStyle/>
+          <a:p>
+            <a:r>
+              <a:rPr sz="2800" b="1">
+                <a:solidFill>
+                  <a:srgbClr val="1E293B"/>
+                </a:solidFill>
+                <a:latin typeface="Avenir Black"/>
+              </a:rPr>
+              <a:t>Benchmarking de Precios por Marca</a:t>
+            </a:r>
+          </a:p>
+        </p:txBody>
+      </p:sp>
+      <p:graphicFrame>
+        <p:nvGraphicFramePr>
+          <p:cNvPr id="3" name="Chart 2"/>
+          <p:cNvGraphicFramePr>
+            <a:graphicFrameLocks noGrp="1"/>
+          </p:cNvGraphicFramePr>
+          <p:nvPr/>
+        </p:nvGraphicFramePr>
+        <p:xfrm>
+          <a:off x="457200" y="1188720"/>
+          <a:ext cx="8229600" cy="5486400"/>
+        </p:xfrm>
+        <a:graphic>
+          <a:graphicData uri="http://schemas.openxmlformats.org/drawingml/2006/chart">
+            <c:chart xmlns:c="http://schemas.openxmlformats.org/drawingml/2006/chart" r:id="rId2"/>
+          </a:graphicData>
+        </a:graphic>
+      </p:graphicFrame>
+    </p:spTree>
+  </p:cSld>
+  <p:clrMapOvr>
+    <a:masterClrMapping/>
+  </p:clrMapOvr>
+</p:sld>
+</file>
+
+<file path=ppt/slides/slide13.xml><?xml version="1.0" encoding="utf-8"?>
+<p:sld xmlns:a="http://schemas.openxmlformats.org/drawingml/2006/main" xmlns:p="http://schemas.openxmlformats.org/presentationml/2006/main" xmlns:r="http://schemas.openxmlformats.org/officeDocument/2006/relationships">
+  <p:cSld>
+    <p:spTree>
+      <p:nvGrpSpPr>
+        <p:cNvPr id="1" name=""/>
+        <p:cNvGrpSpPr/>
+        <p:nvPr/>
+      </p:nvGrpSpPr>
+      <p:grpSpPr/>
+      <p:sp>
+        <p:nvSpPr>
+          <p:cNvPr id="2" name="Title 1"/>
+          <p:cNvSpPr>
+            <a:spLocks noGrp="1"/>
+          </p:cNvSpPr>
+          <p:nvPr>
+            <p:ph type="title"/>
+          </p:nvPr>
+        </p:nvSpPr>
+        <p:spPr/>
+        <p:txBody>
+          <a:bodyPr/>
+          <a:lstStyle/>
+          <a:p>
+            <a:r>
+              <a:rPr sz="2800" b="1">
+                <a:solidFill>
+                  <a:srgbClr val="1E293B"/>
+                </a:solidFill>
+                <a:latin typeface="Avenir Black"/>
+              </a:rPr>
+              <a:t>Benchmarking de Precios por Marca</a:t>
+            </a:r>
+          </a:p>
+        </p:txBody>
+      </p:sp>
+      <p:graphicFrame>
+        <p:nvGraphicFramePr>
+          <p:cNvPr id="3" name="Table 2"/>
+          <p:cNvGraphicFramePr>
+            <a:graphicFrameLocks noGrp="1"/>
+          </p:cNvGraphicFramePr>
+          <p:nvPr/>
+        </p:nvGraphicFramePr>
+        <p:xfrm>
+          <a:off x="457200" y="1371600"/>
+          <a:ext cx="8229600" cy="1097280"/>
+        </p:xfrm>
+        <a:graphic>
+          <a:graphicData uri="http://schemas.openxmlformats.org/drawingml/2006/table">
+            <a:tbl>
+              <a:tblPr firstRow="1" bandRow="1">
+                <a:tableStyleId>{5C22544A-7EE6-4342-B048-85BDC9FD1C3A}</a:tableStyleId>
+              </a:tblPr>
+              <a:tblGrid>
+                <a:gridCol w="2743200"/>
+                <a:gridCol w="2743200"/>
+                <a:gridCol w="2743200"/>
+              </a:tblGrid>
+              <a:tr h="365760">
+                <a:tc>
+                  <a:txBody>
+                    <a:bodyPr/>
+                    <a:lstStyle/>
+                    <a:p>
+                      <a:pPr algn="ctr">
+                        <a:defRPr b="1" sz="1000">
+                          <a:solidFill>
+                            <a:srgbClr val="FFFFFF"/>
+                          </a:solidFill>
+                          <a:latin typeface="Avenir Medium"/>
+                        </a:defRPr>
+                      </a:pPr>
+                      <a:r>
+                        <a:t>Brand</a:t>
+                      </a:r>
+                    </a:p>
+                  </a:txBody>
+                  <a:tcPr>
+                    <a:solidFill>
+                      <a:srgbClr val="1E293B"/>
+                    </a:solidFill>
+                  </a:tcPr>
+                </a:tc>
+                <a:tc>
+                  <a:txBody>
+                    <a:bodyPr/>
+                    <a:lstStyle/>
+                    <a:p>
+                      <a:pPr algn="ctr">
+                        <a:defRPr b="1" sz="1000">
+                          <a:solidFill>
+                            <a:srgbClr val="FFFFFF"/>
+                          </a:solidFill>
+                          <a:latin typeface="Avenir Medium"/>
+                        </a:defRPr>
+                      </a:pPr>
+                      <a:r>
+                        <a:t>Min</a:t>
+                      </a:r>
+                    </a:p>
+                  </a:txBody>
+                  <a:tcPr>
+                    <a:solidFill>
+                      <a:srgbClr val="1E293B"/>
+                    </a:solidFill>
+                  </a:tcPr>
+                </a:tc>
+                <a:tc>
+                  <a:txBody>
+                    <a:bodyPr/>
+                    <a:lstStyle/>
+                    <a:p>
+                      <a:pPr algn="ctr">
+                        <a:defRPr b="1" sz="1000">
+                          <a:solidFill>
+                            <a:srgbClr val="FFFFFF"/>
+                          </a:solidFill>
+                          <a:latin typeface="Avenir Medium"/>
+                        </a:defRPr>
+                      </a:pPr>
+                      <a:r>
+                        <a:t>Max</a:t>
+                      </a:r>
+                    </a:p>
+                  </a:txBody>
+                  <a:tcPr>
+                    <a:solidFill>
+                      <a:srgbClr val="1E293B"/>
+                    </a:solidFill>
+                  </a:tcPr>
+                </a:tc>
+              </a:tr>
+              <a:tr h="365760">
+                <a:tc>
+                  <a:txBody>
+                    <a:bodyPr/>
+                    <a:lstStyle/>
+                    <a:p>
+                      <a:pPr algn="l">
+                        <a:defRPr sz="900">
+                          <a:latin typeface="Avenir Medium"/>
+                        </a:defRPr>
+                      </a:pPr>
+                      <a:r>
+                        <a:t>Toyota</a:t>
+                      </a:r>
+                    </a:p>
+                  </a:txBody>
+                  <a:tcPr/>
+                </a:tc>
+                <a:tc>
+                  <a:txBody>
+                    <a:bodyPr/>
+                    <a:lstStyle/>
+                    <a:p>
+                      <a:pPr algn="r">
+                        <a:defRPr sz="900">
+                          <a:latin typeface="Avenir Medium"/>
+                        </a:defRPr>
+                      </a:pPr>
+                      <a:r>
+                        <a:t>$ 10.000.000</a:t>
+                      </a:r>
+                    </a:p>
+                  </a:txBody>
+                  <a:tcPr/>
+                </a:tc>
+                <a:tc>
+                  <a:txBody>
+                    <a:bodyPr/>
+                    <a:lstStyle/>
+                    <a:p>
+                      <a:pPr algn="r">
+                        <a:defRPr sz="900">
+                          <a:latin typeface="Avenir Medium"/>
+                        </a:defRPr>
+                      </a:pPr>
+                      <a:r>
+                        <a:t>$ 20.000.000</a:t>
+                      </a:r>
+                    </a:p>
+                  </a:txBody>
+                  <a:tcPr/>
+                </a:tc>
+              </a:tr>
+              <a:tr h="365760">
+                <a:tc>
+                  <a:txBody>
+                    <a:bodyPr/>
+                    <a:lstStyle/>
+                    <a:p>
+                      <a:pPr algn="l">
+                        <a:defRPr sz="900">
+                          <a:latin typeface="Avenir Medium"/>
+                        </a:defRPr>
+                      </a:pPr>
+                      <a:r>
+                        <a:t>Kia</a:t>
+                      </a:r>
+                    </a:p>
+                  </a:txBody>
+                  <a:tcPr/>
+                </a:tc>
+                <a:tc>
+                  <a:txBody>
+                    <a:bodyPr/>
+                    <a:lstStyle/>
+                    <a:p>
+                      <a:pPr algn="r">
+                        <a:defRPr sz="900">
+                          <a:latin typeface="Avenir Medium"/>
+                        </a:defRPr>
+                      </a:pPr>
+                      <a:r>
+                        <a:t>$ 9.000.000</a:t>
+                      </a:r>
+                    </a:p>
+                  </a:txBody>
+                  <a:tcPr/>
+                </a:tc>
+                <a:tc>
+                  <a:txBody>
+                    <a:bodyPr/>
+                    <a:lstStyle/>
+                    <a:p>
+                      <a:pPr algn="r">
+                        <a:defRPr sz="900">
+                          <a:latin typeface="Avenir Medium"/>
+                        </a:defRPr>
+                      </a:pPr>
+                      <a:r>
+                        <a:t>$ 18.000.000</a:t>
+                      </a:r>
+                    </a:p>
+                  </a:txBody>
+                  <a:tcPr/>
+                </a:tc>
+              </a:tr>
+            </a:tbl>
+          </a:graphicData>
+        </a:graphic>
+      </p:graphicFrame>
+    </p:spTree>
+  </p:cSld>
+  <p:clrMapOvr>
+    <a:masterClrMapping/>
+  </p:clrMapOvr>
+</p:sld>
+</file>
+
+<file path=ppt/slides/slide14.xml><?xml version="1.0" encoding="utf-8"?>
+<p:sld xmlns:a="http://schemas.openxmlformats.org/drawingml/2006/main" xmlns:p="http://schemas.openxmlformats.org/presentationml/2006/main" xmlns:r="http://schemas.openxmlformats.org/officeDocument/2006/relationships">
+  <p:cSld>
     <p:bg>
       <p:bgPr>
         <a:solidFill>
@@ -4211,30 +4692,6 @@
         <p:nvPr/>
       </p:nvGrpSpPr>
       <p:grpSpPr/>
-      <p:pic>
-        <p:nvPicPr>
-          <p:cNvPr id="2" name="Picture 1" descr="image.png"/>
-          <p:cNvPicPr>
-            <a:picLocks noChangeAspect="1"/>
-          </p:cNvPicPr>
-          <p:nvPr/>
-        </p:nvPicPr>
-        <p:blipFill>
-          <a:blip r:embed="rId2"/>
-          <a:stretch>
-            <a:fillRect/>
-          </a:stretch>
-        </p:blipFill>
-        <p:spPr>
-          <a:xfrm>
-            <a:off x="2057400" y="914400"/>
-            <a:ext cx="5029200" cy="5029200"/>
-          </a:xfrm>
-          <a:prstGeom prst="rect">
-            <a:avLst/>
-          </a:prstGeom>
-        </p:spPr>
-      </p:pic>
     </p:spTree>
   </p:cSld>
   <p:clrMapOvr>
@@ -4253,33 +4710,9 @@
         <p:nvPr/>
       </p:nvGrpSpPr>
       <p:grpSpPr/>
-      <p:pic>
-        <p:nvPicPr>
-          <p:cNvPr id="2" name="Picture 1" descr="image.jpg"/>
-          <p:cNvPicPr>
-            <a:picLocks noChangeAspect="1"/>
-          </p:cNvPicPr>
-          <p:nvPr/>
-        </p:nvPicPr>
-        <p:blipFill>
-          <a:blip r:embed="rId2"/>
-          <a:stretch>
-            <a:fillRect/>
-          </a:stretch>
-        </p:blipFill>
-        <p:spPr>
-          <a:xfrm>
-            <a:off x="0" y="0"/>
-            <a:ext cx="9144000" cy="6858000"/>
-          </a:xfrm>
-          <a:prstGeom prst="rect">
-            <a:avLst/>
-          </a:prstGeom>
-        </p:spPr>
-      </p:pic>
-      <p:sp>
-        <p:nvSpPr>
-          <p:cNvPr id="3" name="TextBox 2"/>
+      <p:sp>
+        <p:nvSpPr>
+          <p:cNvPr id="2" name="TextBox 1"/>
           <p:cNvSpPr txBox="1"/>
           <p:nvPr/>
         </p:nvSpPr>
@@ -4322,7 +4755,7 @@
               </a:defRPr>
             </a:pPr>
             <a:r>
-              <a:t>Generado: 31/01/2026</a:t>
+              <a:t>Generado: 01/02/2026</a:t>
             </a:r>
           </a:p>
         </p:txBody>

</xml_diff>

<commit_message>
feat: add API for dynamic PowerPoint presentation generation with asset support.
</commit_message>
<xml_diff>
--- a/test_output_charts.pptx
+++ b/test_output_charts.pptx
@@ -3983,6 +3983,30 @@
         <p:nvPr/>
       </p:nvGrpSpPr>
       <p:grpSpPr/>
+      <p:pic>
+        <p:nvPicPr>
+          <p:cNvPr id="2" name="Picture 1" descr="image.png"/>
+          <p:cNvPicPr>
+            <a:picLocks noChangeAspect="1"/>
+          </p:cNvPicPr>
+          <p:nvPr/>
+        </p:nvPicPr>
+        <p:blipFill>
+          <a:blip r:embed="rId2"/>
+          <a:stretch>
+            <a:fillRect/>
+          </a:stretch>
+        </p:blipFill>
+        <p:spPr>
+          <a:xfrm>
+            <a:off x="2057400" y="1621631"/>
+            <a:ext cx="5029200" cy="3614738"/>
+          </a:xfrm>
+          <a:prstGeom prst="rect">
+            <a:avLst/>
+          </a:prstGeom>
+        </p:spPr>
+      </p:pic>
     </p:spTree>
   </p:cSld>
   <p:clrMapOvr>
@@ -4692,6 +4716,30 @@
         <p:nvPr/>
       </p:nvGrpSpPr>
       <p:grpSpPr/>
+      <p:pic>
+        <p:nvPicPr>
+          <p:cNvPr id="2" name="Picture 1" descr="image.png"/>
+          <p:cNvPicPr>
+            <a:picLocks noChangeAspect="1"/>
+          </p:cNvPicPr>
+          <p:nvPr/>
+        </p:nvPicPr>
+        <p:blipFill>
+          <a:blip r:embed="rId2"/>
+          <a:stretch>
+            <a:fillRect/>
+          </a:stretch>
+        </p:blipFill>
+        <p:spPr>
+          <a:xfrm>
+            <a:off x="2057400" y="1621631"/>
+            <a:ext cx="5029200" cy="3614738"/>
+          </a:xfrm>
+          <a:prstGeom prst="rect">
+            <a:avLst/>
+          </a:prstGeom>
+        </p:spPr>
+      </p:pic>
     </p:spTree>
   </p:cSld>
   <p:clrMapOvr>

</xml_diff>

<commit_message>
feat: Add base64 encoded logo asset in `ppt_assets.py` and update `test_output_charts.pptx`.
</commit_message>
<xml_diff>
--- a/test_output_charts.pptx
+++ b/test_output_charts.pptx
@@ -3999,8 +3999,8 @@
         </p:blipFill>
         <p:spPr>
           <a:xfrm>
-            <a:off x="2057400" y="1621631"/>
-            <a:ext cx="5029200" cy="3614738"/>
+            <a:off x="2057400" y="914400"/>
+            <a:ext cx="5029200" cy="5029200"/>
           </a:xfrm>
           <a:prstGeom prst="rect">
             <a:avLst/>
@@ -4732,8 +4732,8 @@
         </p:blipFill>
         <p:spPr>
           <a:xfrm>
-            <a:off x="2057400" y="1621631"/>
-            <a:ext cx="5029200" cy="3614738"/>
+            <a:off x="2057400" y="914400"/>
+            <a:ext cx="5029200" cy="5029200"/>
           </a:xfrm>
           <a:prstGeom prst="rect">
             <a:avLst/>
@@ -4758,9 +4758,33 @@
         <p:nvPr/>
       </p:nvGrpSpPr>
       <p:grpSpPr/>
-      <p:sp>
-        <p:nvSpPr>
-          <p:cNvPr id="2" name="TextBox 1"/>
+      <p:pic>
+        <p:nvPicPr>
+          <p:cNvPr id="2" name="Picture 1" descr="image.jpg"/>
+          <p:cNvPicPr>
+            <a:picLocks noChangeAspect="1"/>
+          </p:cNvPicPr>
+          <p:nvPr/>
+        </p:nvPicPr>
+        <p:blipFill>
+          <a:blip r:embed="rId2"/>
+          <a:stretch>
+            <a:fillRect/>
+          </a:stretch>
+        </p:blipFill>
+        <p:spPr>
+          <a:xfrm>
+            <a:off x="0" y="0"/>
+            <a:ext cx="9144000" cy="6858000"/>
+          </a:xfrm>
+          <a:prstGeom prst="rect">
+            <a:avLst/>
+          </a:prstGeom>
+        </p:spPr>
+      </p:pic>
+      <p:sp>
+        <p:nvSpPr>
+          <p:cNvPr id="3" name="TextBox 2"/>
           <p:cNvSpPr txBox="1"/>
           <p:nvPr/>
         </p:nvSpPr>

</xml_diff>

<commit_message>
feat: Add logo assets (`white-logo.png`, `ppt_assets.py`) and update `test_output_charts.pptx`.
</commit_message>
<xml_diff>
--- a/test_output_charts.pptx
+++ b/test_output_charts.pptx
@@ -3999,8 +3999,8 @@
         </p:blipFill>
         <p:spPr>
           <a:xfrm>
-            <a:off x="2057400" y="914400"/>
-            <a:ext cx="5029200" cy="5029200"/>
+            <a:off x="2057400" y="1621631"/>
+            <a:ext cx="5029200" cy="3614738"/>
           </a:xfrm>
           <a:prstGeom prst="rect">
             <a:avLst/>
@@ -4732,8 +4732,8 @@
         </p:blipFill>
         <p:spPr>
           <a:xfrm>
-            <a:off x="2057400" y="914400"/>
-            <a:ext cx="5029200" cy="5029200"/>
+            <a:off x="2057400" y="1621631"/>
+            <a:ext cx="5029200" cy="3614738"/>
           </a:xfrm>
           <a:prstGeom prst="rect">
             <a:avLst/>

</xml_diff>